<commit_message>
Se creo pdf file de ppt
</commit_message>
<xml_diff>
--- a/2018/Git-github-fundamentals/gitgithubfundamentals.pptx
+++ b/2018/Git-github-fundamentals/gitgithubfundamentals.pptx
@@ -243,7 +243,7 @@
           <a:p>
             <a:fld id="{649D720D-DDB5-44A4-BBBF-4CA335314AF3}" type="datetimeFigureOut">
               <a:rPr lang="es-MX" smtClean="0"/>
-              <a:t>24/04/2018</a:t>
+              <a:t>25/04/2018</a:t>
             </a:fld>
             <a:endParaRPr lang="es-MX"/>
           </a:p>
@@ -1019,7 +1019,7 @@
           <a:p>
             <a:fld id="{A81717EF-3C14-4F00-8C8A-E97CFC318462}" type="datetimeFigureOut">
               <a:rPr lang="es-MX" smtClean="0"/>
-              <a:t>24/04/2018</a:t>
+              <a:t>25/04/2018</a:t>
             </a:fld>
             <a:endParaRPr lang="es-MX"/>
           </a:p>
@@ -1189,7 +1189,7 @@
           <a:p>
             <a:fld id="{A81717EF-3C14-4F00-8C8A-E97CFC318462}" type="datetimeFigureOut">
               <a:rPr lang="es-MX" smtClean="0"/>
-              <a:t>24/04/2018</a:t>
+              <a:t>25/04/2018</a:t>
             </a:fld>
             <a:endParaRPr lang="es-MX"/>
           </a:p>
@@ -1369,7 +1369,7 @@
           <a:p>
             <a:fld id="{A81717EF-3C14-4F00-8C8A-E97CFC318462}" type="datetimeFigureOut">
               <a:rPr lang="es-MX" smtClean="0"/>
-              <a:t>24/04/2018</a:t>
+              <a:t>25/04/2018</a:t>
             </a:fld>
             <a:endParaRPr lang="es-MX"/>
           </a:p>
@@ -1539,7 +1539,7 @@
           <a:p>
             <a:fld id="{A81717EF-3C14-4F00-8C8A-E97CFC318462}" type="datetimeFigureOut">
               <a:rPr lang="es-MX" smtClean="0"/>
-              <a:t>24/04/2018</a:t>
+              <a:t>25/04/2018</a:t>
             </a:fld>
             <a:endParaRPr lang="es-MX"/>
           </a:p>
@@ -1785,7 +1785,7 @@
           <a:p>
             <a:fld id="{A81717EF-3C14-4F00-8C8A-E97CFC318462}" type="datetimeFigureOut">
               <a:rPr lang="es-MX" smtClean="0"/>
-              <a:t>24/04/2018</a:t>
+              <a:t>25/04/2018</a:t>
             </a:fld>
             <a:endParaRPr lang="es-MX"/>
           </a:p>
@@ -2017,7 +2017,7 @@
           <a:p>
             <a:fld id="{A81717EF-3C14-4F00-8C8A-E97CFC318462}" type="datetimeFigureOut">
               <a:rPr lang="es-MX" smtClean="0"/>
-              <a:t>24/04/2018</a:t>
+              <a:t>25/04/2018</a:t>
             </a:fld>
             <a:endParaRPr lang="es-MX"/>
           </a:p>
@@ -2384,7 +2384,7 @@
           <a:p>
             <a:fld id="{A81717EF-3C14-4F00-8C8A-E97CFC318462}" type="datetimeFigureOut">
               <a:rPr lang="es-MX" smtClean="0"/>
-              <a:t>24/04/2018</a:t>
+              <a:t>25/04/2018</a:t>
             </a:fld>
             <a:endParaRPr lang="es-MX"/>
           </a:p>
@@ -2502,7 +2502,7 @@
           <a:p>
             <a:fld id="{A81717EF-3C14-4F00-8C8A-E97CFC318462}" type="datetimeFigureOut">
               <a:rPr lang="es-MX" smtClean="0"/>
-              <a:t>24/04/2018</a:t>
+              <a:t>25/04/2018</a:t>
             </a:fld>
             <a:endParaRPr lang="es-MX"/>
           </a:p>
@@ -2597,7 +2597,7 @@
           <a:p>
             <a:fld id="{A81717EF-3C14-4F00-8C8A-E97CFC318462}" type="datetimeFigureOut">
               <a:rPr lang="es-MX" smtClean="0"/>
-              <a:t>24/04/2018</a:t>
+              <a:t>25/04/2018</a:t>
             </a:fld>
             <a:endParaRPr lang="es-MX"/>
           </a:p>
@@ -2874,7 +2874,7 @@
           <a:p>
             <a:fld id="{A81717EF-3C14-4F00-8C8A-E97CFC318462}" type="datetimeFigureOut">
               <a:rPr lang="es-MX" smtClean="0"/>
-              <a:t>24/04/2018</a:t>
+              <a:t>25/04/2018</a:t>
             </a:fld>
             <a:endParaRPr lang="es-MX"/>
           </a:p>
@@ -3127,7 +3127,7 @@
           <a:p>
             <a:fld id="{A81717EF-3C14-4F00-8C8A-E97CFC318462}" type="datetimeFigureOut">
               <a:rPr lang="es-MX" smtClean="0"/>
-              <a:t>24/04/2018</a:t>
+              <a:t>25/04/2018</a:t>
             </a:fld>
             <a:endParaRPr lang="es-MX"/>
           </a:p>
@@ -3340,7 +3340,7 @@
           <a:p>
             <a:fld id="{A81717EF-3C14-4F00-8C8A-E97CFC318462}" type="datetimeFigureOut">
               <a:rPr lang="es-MX" smtClean="0"/>
-              <a:t>24/04/2018</a:t>
+              <a:t>25/04/2018</a:t>
             </a:fld>
             <a:endParaRPr lang="es-MX"/>
           </a:p>
@@ -4132,13 +4132,6 @@
               </a:rPr>
               <a:t>]</a:t>
             </a:r>
-            <a:endParaRPr lang="es-MX" sz="2400" dirty="0" smtClean="0">
-              <a:solidFill>
-                <a:srgbClr val="4B6584"/>
-              </a:solidFill>
-              <a:latin typeface="Roboto" panose="02000000000000000000" pitchFamily="2" charset="0"/>
-              <a:ea typeface="Roboto" panose="02000000000000000000" pitchFamily="2" charset="0"/>
-            </a:endParaRPr>
           </a:p>
           <a:p>
             <a:pPr marL="0" indent="0">
@@ -8820,7 +8813,7 @@
               <a:t> &amp; GitHub</a:t>
             </a:r>
             <a:r>
-              <a:rPr lang="es-MX" sz="8000" dirty="0" smtClean="0">
+              <a:rPr lang="es-MX" sz="8000" dirty="0">
                 <a:solidFill>
                   <a:srgbClr val="B71540"/>
                 </a:solidFill>
@@ -8831,7 +8824,7 @@
               <a:t/>
             </a:r>
             <a:br>
-              <a:rPr lang="es-MX" sz="8000" dirty="0" smtClean="0">
+              <a:rPr lang="es-MX" sz="8000" dirty="0">
                 <a:solidFill>
                   <a:srgbClr val="B71540"/>
                 </a:solidFill>

</xml_diff>